<commit_message>
Added missing slides in the Draft
Slides for Best Practice and Project learnings added.
</commit_message>
<xml_diff>
--- a/presentation/Cloud Network Security Threat Analysis.pptx
+++ b/presentation/Cloud Network Security Threat Analysis.pptx
@@ -5,10 +5,10 @@
     <p:sldMasterId id="2147483799" r:id="rId4"/>
   </p:sldMasterIdLst>
   <p:notesMasterIdLst>
-    <p:notesMasterId r:id="rId14"/>
+    <p:notesMasterId r:id="rId16"/>
   </p:notesMasterIdLst>
   <p:handoutMasterIdLst>
-    <p:handoutMasterId r:id="rId15"/>
+    <p:handoutMasterId r:id="rId17"/>
   </p:handoutMasterIdLst>
   <p:sldIdLst>
     <p:sldId id="256" r:id="rId5"/>
@@ -19,7 +19,9 @@
     <p:sldId id="301" r:id="rId10"/>
     <p:sldId id="302" r:id="rId11"/>
     <p:sldId id="303" r:id="rId12"/>
-    <p:sldId id="294" r:id="rId13"/>
+    <p:sldId id="304" r:id="rId13"/>
+    <p:sldId id="305" r:id="rId14"/>
+    <p:sldId id="294" r:id="rId15"/>
   </p:sldIdLst>
   <p:sldSz cx="12192000" cy="6858000"/>
   <p:notesSz cx="6858000" cy="9144000"/>
@@ -2511,23 +2513,23 @@
       </dgm:t>
     </dgm:pt>
     <dgm:pt modelId="{51E99F87-E3F5-4354-840F-5CE2D4A67B4D}">
-      <dgm:prSet phldrT="[Text]"/>
+      <dgm:prSet phldrT="[Text]" custT="1"/>
       <dgm:spPr/>
       <dgm:t>
         <a:bodyPr/>
         <a:lstStyle/>
         <a:p>
           <a:r>
-            <a:rPr lang="en-US" b="1"/>
+            <a:rPr lang="en-US" sz="800" b="1"/>
             <a:t>Confusion</a:t>
           </a:r>
         </a:p>
         <a:p>
           <a:r>
-            <a:rPr lang="en-US"/>
+            <a:rPr lang="en-US" sz="800"/>
             <a:t>The deliverables  responsibilities split  but…</a:t>
           </a:r>
-          <a:endParaRPr lang="en-AE" dirty="0"/>
+          <a:endParaRPr lang="en-AE" sz="800" dirty="0"/>
         </a:p>
       </dgm:t>
     </dgm:pt>
@@ -2562,17 +2564,17 @@
       </dgm:t>
     </dgm:pt>
     <dgm:pt modelId="{2477D4FC-A9B2-434E-93CC-7B5A7D4C0ABE}">
-      <dgm:prSet phldrT="[Text]"/>
+      <dgm:prSet phldrT="[Text]" custT="1"/>
       <dgm:spPr/>
       <dgm:t>
         <a:bodyPr/>
         <a:lstStyle/>
         <a:p>
           <a:r>
-            <a:rPr lang="en-US" b="1"/>
+            <a:rPr lang="en-US" sz="600" b="1"/>
             <a:t>Not sure what to analysis- real network/ imaginary??</a:t>
           </a:r>
-          <a:endParaRPr lang="en-AE" dirty="0"/>
+          <a:endParaRPr lang="en-AE" sz="600" dirty="0"/>
         </a:p>
       </dgm:t>
     </dgm:pt>
@@ -2844,17 +2846,17 @@
       </dgm:t>
     </dgm:pt>
     <dgm:pt modelId="{C15CFD1F-7D11-4DB9-A145-90C3D19EBA5E}">
-      <dgm:prSet/>
+      <dgm:prSet custT="1"/>
       <dgm:spPr/>
       <dgm:t>
         <a:bodyPr/>
         <a:lstStyle/>
         <a:p>
           <a:r>
-            <a:rPr lang="en-US" b="1"/>
+            <a:rPr lang="en-US" sz="600" b="1"/>
             <a:t>Who to do what at the beginning</a:t>
           </a:r>
-          <a:endParaRPr lang="en-AE" b="1" dirty="0"/>
+          <a:endParaRPr lang="en-AE" sz="600" b="1" dirty="0"/>
         </a:p>
       </dgm:t>
     </dgm:pt>
@@ -2889,17 +2891,17 @@
       </dgm:t>
     </dgm:pt>
     <dgm:pt modelId="{6E35B1CE-1424-4C03-AA5A-B8EEBE2D6083}">
-      <dgm:prSet/>
+      <dgm:prSet custT="1"/>
       <dgm:spPr/>
       <dgm:t>
         <a:bodyPr/>
         <a:lstStyle/>
         <a:p>
           <a:r>
-            <a:rPr lang="en-US" b="1"/>
+            <a:rPr lang="en-US" sz="600" b="1"/>
             <a:t>Which AI tool and how to use</a:t>
           </a:r>
-          <a:endParaRPr lang="en-AE" b="1" dirty="0"/>
+          <a:endParaRPr lang="en-AE" sz="600" b="1" dirty="0"/>
         </a:p>
       </dgm:t>
     </dgm:pt>
@@ -2934,17 +2936,17 @@
       </dgm:t>
     </dgm:pt>
     <dgm:pt modelId="{A1FB067B-0E43-446F-89ED-9022B406B9DF}">
-      <dgm:prSet/>
+      <dgm:prSet custT="1"/>
       <dgm:spPr/>
       <dgm:t>
         <a:bodyPr/>
         <a:lstStyle/>
         <a:p>
           <a:r>
-            <a:rPr lang="en-US" b="1"/>
+            <a:rPr lang="en-US" sz="600" b="1"/>
             <a:t>Each to his own “domain</a:t>
           </a:r>
-          <a:endParaRPr lang="en-AE" dirty="0"/>
+          <a:endParaRPr lang="en-AE" sz="600" dirty="0"/>
         </a:p>
       </dgm:t>
     </dgm:pt>
@@ -5558,8 +5560,8 @@
       </dsp:nvSpPr>
       <dsp:spPr>
         <a:xfrm>
-          <a:off x="878" y="1414615"/>
-          <a:ext cx="1143800" cy="1143800"/>
+          <a:off x="930" y="1573016"/>
+          <a:ext cx="1211654" cy="1211654"/>
         </a:xfrm>
         <a:prstGeom prst="roundRect">
           <a:avLst>
@@ -5613,8 +5615,8 @@
       </dsp:nvSpPr>
       <dsp:spPr>
         <a:xfrm>
-          <a:off x="187078" y="2100895"/>
-          <a:ext cx="1143800" cy="1143800"/>
+          <a:off x="198176" y="2300009"/>
+          <a:ext cx="1211654" cy="1211654"/>
         </a:xfrm>
         <a:prstGeom prst="roundRect">
           <a:avLst>
@@ -5658,12 +5660,12 @@
         </a:fontRef>
       </dsp:style>
       <dsp:txBody>
-        <a:bodyPr spcFirstLastPara="0" vert="horz" wrap="square" lIns="26670" tIns="26670" rIns="26670" bIns="26670" numCol="1" spcCol="1270" anchor="t" anchorCtr="0">
+        <a:bodyPr spcFirstLastPara="0" vert="horz" wrap="square" lIns="30480" tIns="30480" rIns="30480" bIns="30480" numCol="1" spcCol="1270" anchor="t" anchorCtr="0">
           <a:noAutofit/>
         </a:bodyPr>
         <a:lstStyle/>
         <a:p>
-          <a:pPr marL="0" lvl="0" indent="0" algn="l" defTabSz="311150">
+          <a:pPr marL="0" lvl="0" indent="0" algn="l" defTabSz="355600">
             <a:lnSpc>
               <a:spcPct val="90000"/>
             </a:lnSpc>
@@ -5676,12 +5678,12 @@
             <a:buNone/>
           </a:pPr>
           <a:r>
-            <a:rPr lang="en-US" sz="700" b="1" kern="1200"/>
+            <a:rPr lang="en-US" sz="800" b="1" kern="1200"/>
             <a:t>Confusion</a:t>
           </a:r>
         </a:p>
         <a:p>
-          <a:pPr marL="0" lvl="0" indent="0" algn="l" defTabSz="311150">
+          <a:pPr marL="0" lvl="0" indent="0" algn="l" defTabSz="355600">
             <a:lnSpc>
               <a:spcPct val="90000"/>
             </a:lnSpc>
@@ -5694,13 +5696,13 @@
             <a:buNone/>
           </a:pPr>
           <a:r>
-            <a:rPr lang="en-US" sz="700" kern="1200"/>
+            <a:rPr lang="en-US" sz="800" kern="1200"/>
             <a:t>The deliverables  responsibilities split  but…</a:t>
           </a:r>
-          <a:endParaRPr lang="en-AE" sz="700" kern="1200" dirty="0"/>
+          <a:endParaRPr lang="en-AE" sz="800" kern="1200" dirty="0"/>
         </a:p>
         <a:p>
-          <a:pPr marL="57150" lvl="1" indent="-57150" algn="l" defTabSz="222250">
+          <a:pPr marL="57150" lvl="1" indent="-57150" algn="l" defTabSz="266700">
             <a:lnSpc>
               <a:spcPct val="90000"/>
             </a:lnSpc>
@@ -5713,13 +5715,13 @@
             <a:buChar char="•"/>
           </a:pPr>
           <a:r>
-            <a:rPr lang="en-US" sz="500" b="1" kern="1200"/>
+            <a:rPr lang="en-US" sz="600" b="1" kern="1200"/>
             <a:t>Not sure what to analysis- real network/ imaginary??</a:t>
           </a:r>
-          <a:endParaRPr lang="en-AE" sz="500" kern="1200" dirty="0"/>
+          <a:endParaRPr lang="en-AE" sz="600" kern="1200" dirty="0"/>
         </a:p>
         <a:p>
-          <a:pPr marL="57150" lvl="1" indent="-57150" algn="l" defTabSz="222250">
+          <a:pPr marL="57150" lvl="1" indent="-57150" algn="l" defTabSz="266700">
             <a:lnSpc>
               <a:spcPct val="90000"/>
             </a:lnSpc>
@@ -5732,13 +5734,13 @@
             <a:buChar char="•"/>
           </a:pPr>
           <a:r>
-            <a:rPr lang="en-US" sz="500" b="1" kern="1200"/>
+            <a:rPr lang="en-US" sz="600" b="1" kern="1200"/>
             <a:t>Who to do what at the beginning</a:t>
           </a:r>
-          <a:endParaRPr lang="en-AE" sz="500" b="1" kern="1200" dirty="0"/>
+          <a:endParaRPr lang="en-AE" sz="600" b="1" kern="1200" dirty="0"/>
         </a:p>
         <a:p>
-          <a:pPr marL="57150" lvl="1" indent="-57150" algn="l" defTabSz="222250">
+          <a:pPr marL="57150" lvl="1" indent="-57150" algn="l" defTabSz="266700">
             <a:lnSpc>
               <a:spcPct val="90000"/>
             </a:lnSpc>
@@ -5751,13 +5753,13 @@
             <a:buChar char="•"/>
           </a:pPr>
           <a:r>
-            <a:rPr lang="en-US" sz="500" b="1" kern="1200"/>
+            <a:rPr lang="en-US" sz="600" b="1" kern="1200"/>
             <a:t>Which AI tool and how to use</a:t>
           </a:r>
-          <a:endParaRPr lang="en-AE" sz="500" b="1" kern="1200" dirty="0"/>
+          <a:endParaRPr lang="en-AE" sz="600" b="1" kern="1200" dirty="0"/>
         </a:p>
         <a:p>
-          <a:pPr marL="57150" lvl="1" indent="-57150" algn="l" defTabSz="222250">
+          <a:pPr marL="57150" lvl="1" indent="-57150" algn="l" defTabSz="266700">
             <a:lnSpc>
               <a:spcPct val="90000"/>
             </a:lnSpc>
@@ -5770,15 +5772,15 @@
             <a:buChar char="•"/>
           </a:pPr>
           <a:r>
-            <a:rPr lang="en-US" sz="500" b="1" kern="1200"/>
+            <a:rPr lang="en-US" sz="600" b="1" kern="1200"/>
             <a:t>Each to his own “domain</a:t>
           </a:r>
-          <a:endParaRPr lang="en-AE" sz="500" kern="1200" dirty="0"/>
+          <a:endParaRPr lang="en-AE" sz="600" kern="1200" dirty="0"/>
         </a:p>
       </dsp:txBody>
       <dsp:txXfrm>
-        <a:off x="220579" y="2134396"/>
-        <a:ext cx="1076798" cy="1076798"/>
+        <a:off x="233664" y="2335497"/>
+        <a:ext cx="1140678" cy="1140678"/>
       </dsp:txXfrm>
     </dsp:sp>
     <dsp:sp modelId="{3C4C8F0F-C271-4113-94E6-082CBB457ACD}">
@@ -5788,8 +5790,8 @@
       </dsp:nvSpPr>
       <dsp:spPr>
         <a:xfrm>
-          <a:off x="1364999" y="1849096"/>
-          <a:ext cx="220321" cy="274839"/>
+          <a:off x="1445977" y="2033272"/>
+          <a:ext cx="233391" cy="291143"/>
         </a:xfrm>
         <a:prstGeom prst="rightArrow">
           <a:avLst>
@@ -5831,7 +5833,7 @@
         </a:bodyPr>
         <a:lstStyle/>
         <a:p>
-          <a:pPr marL="0" lvl="0" indent="0" algn="ctr" defTabSz="222250">
+          <a:pPr marL="0" lvl="0" indent="0" algn="ctr" defTabSz="266700">
             <a:lnSpc>
               <a:spcPct val="90000"/>
             </a:lnSpc>
@@ -5843,7 +5845,7 @@
             </a:spcAft>
             <a:buNone/>
           </a:pPr>
-          <a:endParaRPr lang="en-AE" sz="500" kern="1200">
+          <a:endParaRPr lang="en-AE" sz="600" kern="1200">
             <a:solidFill>
               <a:schemeClr val="tx1"/>
             </a:solidFill>
@@ -5851,8 +5853,8 @@
         </a:p>
       </dsp:txBody>
       <dsp:txXfrm>
-        <a:off x="1364999" y="1904064"/>
-        <a:ext cx="154225" cy="164903"/>
+        <a:off x="1445977" y="2091501"/>
+        <a:ext cx="163374" cy="174685"/>
       </dsp:txXfrm>
     </dsp:sp>
     <dsp:sp modelId="{6FFFE9E0-0AAF-4BCB-8629-E7154493B1C8}">
@@ -5862,8 +5864,8 @@
       </dsp:nvSpPr>
       <dsp:spPr>
         <a:xfrm>
-          <a:off x="1774167" y="1414615"/>
-          <a:ext cx="1143800" cy="1143800"/>
+          <a:off x="1879418" y="1573016"/>
+          <a:ext cx="1211654" cy="1211654"/>
         </a:xfrm>
         <a:prstGeom prst="roundRect">
           <a:avLst>
@@ -5917,8 +5919,8 @@
       </dsp:nvSpPr>
       <dsp:spPr>
         <a:xfrm>
-          <a:off x="1960367" y="2100895"/>
-          <a:ext cx="1143800" cy="1143800"/>
+          <a:off x="2076664" y="2300009"/>
+          <a:ext cx="1211654" cy="1211654"/>
         </a:xfrm>
         <a:prstGeom prst="roundRect">
           <a:avLst>
@@ -6062,8 +6064,8 @@
         </a:p>
       </dsp:txBody>
       <dsp:txXfrm>
-        <a:off x="1993868" y="2134396"/>
-        <a:ext cx="1076798" cy="1076798"/>
+        <a:off x="2112152" y="2335497"/>
+        <a:ext cx="1140678" cy="1140678"/>
       </dsp:txXfrm>
     </dsp:sp>
     <dsp:sp modelId="{08ABD57E-BCE5-4ED6-8013-D64B752404FD}">
@@ -6073,8 +6075,8 @@
       </dsp:nvSpPr>
       <dsp:spPr>
         <a:xfrm>
-          <a:off x="3138289" y="1849096"/>
-          <a:ext cx="220321" cy="274839"/>
+          <a:off x="3324464" y="2033272"/>
+          <a:ext cx="233391" cy="291143"/>
         </a:xfrm>
         <a:prstGeom prst="rightArrow">
           <a:avLst>
@@ -6116,7 +6118,7 @@
         </a:bodyPr>
         <a:lstStyle/>
         <a:p>
-          <a:pPr marL="0" lvl="0" indent="0" algn="ctr" defTabSz="222250">
+          <a:pPr marL="0" lvl="0" indent="0" algn="ctr" defTabSz="266700">
             <a:lnSpc>
               <a:spcPct val="90000"/>
             </a:lnSpc>
@@ -6128,7 +6130,7 @@
             </a:spcAft>
             <a:buNone/>
           </a:pPr>
-          <a:endParaRPr lang="en-AE" sz="500" kern="1200">
+          <a:endParaRPr lang="en-AE" sz="600" kern="1200">
             <a:solidFill>
               <a:schemeClr val="tx1"/>
             </a:solidFill>
@@ -6136,8 +6138,8 @@
         </a:p>
       </dsp:txBody>
       <dsp:txXfrm>
-        <a:off x="3138289" y="1904064"/>
-        <a:ext cx="154225" cy="164903"/>
+        <a:off x="3324464" y="2091501"/>
+        <a:ext cx="163374" cy="174685"/>
       </dsp:txXfrm>
     </dsp:sp>
     <dsp:sp modelId="{F8CA86C0-ACA8-40DD-9700-AB790B46261F}">
@@ -6147,8 +6149,8 @@
       </dsp:nvSpPr>
       <dsp:spPr>
         <a:xfrm>
-          <a:off x="3547457" y="1414615"/>
-          <a:ext cx="1143800" cy="1143800"/>
+          <a:off x="3757906" y="1573016"/>
+          <a:ext cx="1211654" cy="1211654"/>
         </a:xfrm>
         <a:prstGeom prst="roundRect">
           <a:avLst>
@@ -6202,8 +6204,8 @@
       </dsp:nvSpPr>
       <dsp:spPr>
         <a:xfrm>
-          <a:off x="3733657" y="2100895"/>
-          <a:ext cx="1143800" cy="1143800"/>
+          <a:off x="3955152" y="2300009"/>
+          <a:ext cx="1211654" cy="1211654"/>
         </a:xfrm>
         <a:prstGeom prst="roundRect">
           <a:avLst>
@@ -6347,8 +6349,8 @@
         </a:p>
       </dsp:txBody>
       <dsp:txXfrm>
-        <a:off x="3767158" y="2134396"/>
-        <a:ext cx="1076798" cy="1076798"/>
+        <a:off x="3990640" y="2335497"/>
+        <a:ext cx="1140678" cy="1140678"/>
       </dsp:txXfrm>
     </dsp:sp>
     <dsp:sp modelId="{E7A5D761-DCF9-4DAA-A78F-C07C73CDA977}">
@@ -6358,8 +6360,8 @@
       </dsp:nvSpPr>
       <dsp:spPr>
         <a:xfrm>
-          <a:off x="4911578" y="1849096"/>
-          <a:ext cx="220321" cy="274839"/>
+          <a:off x="5202952" y="2033272"/>
+          <a:ext cx="233391" cy="291143"/>
         </a:xfrm>
         <a:prstGeom prst="rightArrow">
           <a:avLst>
@@ -6401,7 +6403,7 @@
         </a:bodyPr>
         <a:lstStyle/>
         <a:p>
-          <a:pPr marL="0" lvl="0" indent="0" algn="ctr" defTabSz="222250">
+          <a:pPr marL="0" lvl="0" indent="0" algn="ctr" defTabSz="266700">
             <a:lnSpc>
               <a:spcPct val="90000"/>
             </a:lnSpc>
@@ -6413,7 +6415,7 @@
             </a:spcAft>
             <a:buNone/>
           </a:pPr>
-          <a:endParaRPr lang="en-AE" sz="500" kern="1200">
+          <a:endParaRPr lang="en-AE" sz="600" kern="1200">
             <a:solidFill>
               <a:schemeClr val="tx1"/>
             </a:solidFill>
@@ -6421,8 +6423,8 @@
         </a:p>
       </dsp:txBody>
       <dsp:txXfrm>
-        <a:off x="4911578" y="1904064"/>
-        <a:ext cx="154225" cy="164903"/>
+        <a:off x="5202952" y="2091501"/>
+        <a:ext cx="163374" cy="174685"/>
       </dsp:txXfrm>
     </dsp:sp>
     <dsp:sp modelId="{BB86B901-6FC3-461D-91CC-DC12A7FC7A09}">
@@ -6432,8 +6434,8 @@
       </dsp:nvSpPr>
       <dsp:spPr>
         <a:xfrm>
-          <a:off x="5320746" y="1414615"/>
-          <a:ext cx="1143800" cy="1143800"/>
+          <a:off x="5636394" y="1573016"/>
+          <a:ext cx="1211654" cy="1211654"/>
         </a:xfrm>
         <a:prstGeom prst="roundRect">
           <a:avLst>
@@ -6487,8 +6489,8 @@
       </dsp:nvSpPr>
       <dsp:spPr>
         <a:xfrm>
-          <a:off x="5506946" y="2100895"/>
-          <a:ext cx="1143800" cy="1143800"/>
+          <a:off x="5833640" y="2300009"/>
+          <a:ext cx="1211654" cy="1211654"/>
         </a:xfrm>
         <a:prstGeom prst="roundRect">
           <a:avLst>
@@ -6632,8 +6634,8 @@
         </a:p>
       </dsp:txBody>
       <dsp:txXfrm>
-        <a:off x="5540447" y="2134396"/>
-        <a:ext cx="1076798" cy="1076798"/>
+        <a:off x="5869128" y="2335497"/>
+        <a:ext cx="1140678" cy="1140678"/>
       </dsp:txXfrm>
     </dsp:sp>
   </dsp:spTree>
@@ -13666,7 +13668,7 @@
           <a:p>
             <a:fld id="{B63359F2-43EF-4812-9DC0-98C0B1A40681}" type="slidenum">
               <a:rPr lang="en-US" smtClean="0"/>
-              <a:t>9</a:t>
+              <a:t>11</a:t>
             </a:fld>
             <a:endParaRPr lang="en-US" dirty="0"/>
           </a:p>
@@ -19479,6 +19481,204 @@
 </p:sld>
 </file>
 
+<file path=ppt/slides/slide10.xml><?xml version="1.0" encoding="utf-8"?>
+<p:sld xmlns:a="http://schemas.openxmlformats.org/drawingml/2006/main" xmlns:r="http://schemas.openxmlformats.org/officeDocument/2006/relationships" xmlns:p="http://schemas.openxmlformats.org/presentationml/2006/main">
+  <p:cSld>
+    <p:spTree>
+      <p:nvGrpSpPr>
+        <p:cNvPr id="1" name=""/>
+        <p:cNvGrpSpPr/>
+        <p:nvPr/>
+      </p:nvGrpSpPr>
+      <p:grpSpPr>
+        <a:xfrm>
+          <a:off x="0" y="0"/>
+          <a:ext cx="0" cy="0"/>
+          <a:chOff x="0" y="0"/>
+          <a:chExt cx="0" cy="0"/>
+        </a:xfrm>
+      </p:grpSpPr>
+      <p:sp>
+        <p:nvSpPr>
+          <p:cNvPr id="2" name="Title 1">
+            <a:extLst>
+              <a:ext uri="{FF2B5EF4-FFF2-40B4-BE49-F238E27FC236}">
+                <a16:creationId xmlns:a16="http://schemas.microsoft.com/office/drawing/2014/main" id="{A89224CA-6457-36B1-5AD5-41952E1706D6}"/>
+              </a:ext>
+            </a:extLst>
+          </p:cNvPr>
+          <p:cNvSpPr>
+            <a:spLocks noGrp="1"/>
+          </p:cNvSpPr>
+          <p:nvPr>
+            <p:ph type="title"/>
+          </p:nvPr>
+        </p:nvSpPr>
+        <p:spPr/>
+        <p:txBody>
+          <a:bodyPr/>
+          <a:lstStyle/>
+          <a:p>
+            <a:r>
+              <a:rPr lang="en-US" dirty="0"/>
+              <a:t>Project learnings- Shubham</a:t>
+            </a:r>
+            <a:endParaRPr lang="en-AE" dirty="0"/>
+          </a:p>
+        </p:txBody>
+      </p:sp>
+      <p:sp>
+        <p:nvSpPr>
+          <p:cNvPr id="3" name="Content Placeholder 2">
+            <a:extLst>
+              <a:ext uri="{FF2B5EF4-FFF2-40B4-BE49-F238E27FC236}">
+                <a16:creationId xmlns:a16="http://schemas.microsoft.com/office/drawing/2014/main" id="{D5C7A388-F0AD-818C-39DD-1218932C6A70}"/>
+              </a:ext>
+            </a:extLst>
+          </p:cNvPr>
+          <p:cNvSpPr>
+            <a:spLocks noGrp="1"/>
+          </p:cNvSpPr>
+          <p:nvPr>
+            <p:ph idx="1"/>
+          </p:nvPr>
+        </p:nvSpPr>
+        <p:spPr/>
+        <p:txBody>
+          <a:bodyPr/>
+          <a:lstStyle/>
+          <a:p>
+            <a:endParaRPr lang="en-AE"/>
+          </a:p>
+        </p:txBody>
+      </p:sp>
+    </p:spTree>
+    <p:extLst>
+      <p:ext uri="{BB962C8B-B14F-4D97-AF65-F5344CB8AC3E}">
+        <p14:creationId xmlns:p14="http://schemas.microsoft.com/office/powerpoint/2010/main" val="2559348353"/>
+      </p:ext>
+    </p:extLst>
+  </p:cSld>
+  <p:clrMapOvr>
+    <a:masterClrMapping/>
+  </p:clrMapOvr>
+</p:sld>
+</file>
+
+<file path=ppt/slides/slide11.xml><?xml version="1.0" encoding="utf-8"?>
+<p:sld xmlns:a="http://schemas.openxmlformats.org/drawingml/2006/main" xmlns:r="http://schemas.openxmlformats.org/officeDocument/2006/relationships" xmlns:p="http://schemas.openxmlformats.org/presentationml/2006/main">
+  <p:cSld>
+    <p:spTree>
+      <p:nvGrpSpPr>
+        <p:cNvPr id="1" name=""/>
+        <p:cNvGrpSpPr/>
+        <p:nvPr/>
+      </p:nvGrpSpPr>
+      <p:grpSpPr>
+        <a:xfrm>
+          <a:off x="0" y="0"/>
+          <a:ext cx="0" cy="0"/>
+          <a:chOff x="0" y="0"/>
+          <a:chExt cx="0" cy="0"/>
+        </a:xfrm>
+      </p:grpSpPr>
+      <p:sp>
+        <p:nvSpPr>
+          <p:cNvPr id="31" name="Title 30">
+            <a:extLst>
+              <a:ext uri="{FF2B5EF4-FFF2-40B4-BE49-F238E27FC236}">
+                <a16:creationId xmlns:a16="http://schemas.microsoft.com/office/drawing/2014/main" id="{B045D6AF-532B-394C-0C6F-38B6628CE9DF}"/>
+              </a:ext>
+            </a:extLst>
+          </p:cNvPr>
+          <p:cNvSpPr>
+            <a:spLocks noGrp="1"/>
+          </p:cNvSpPr>
+          <p:nvPr>
+            <p:ph type="title"/>
+          </p:nvPr>
+        </p:nvSpPr>
+        <p:spPr/>
+        <p:txBody>
+          <a:bodyPr/>
+          <a:lstStyle/>
+          <a:p>
+            <a:r>
+              <a:rPr lang="en-US" dirty="0"/>
+              <a:t>Thank you</a:t>
+            </a:r>
+          </a:p>
+        </p:txBody>
+      </p:sp>
+      <p:sp>
+        <p:nvSpPr>
+          <p:cNvPr id="3" name="Content Placeholder 2">
+            <a:extLst>
+              <a:ext uri="{FF2B5EF4-FFF2-40B4-BE49-F238E27FC236}">
+                <a16:creationId xmlns:a16="http://schemas.microsoft.com/office/drawing/2014/main" id="{2F59B25D-9615-9332-C32E-4F458417E11E}"/>
+              </a:ext>
+            </a:extLst>
+          </p:cNvPr>
+          <p:cNvSpPr>
+            <a:spLocks noGrp="1"/>
+          </p:cNvSpPr>
+          <p:nvPr>
+            <p:ph sz="quarter" idx="4"/>
+          </p:nvPr>
+        </p:nvSpPr>
+        <p:spPr>
+          <a:xfrm>
+            <a:off x="462151" y="2862480"/>
+            <a:ext cx="3672970" cy="3491849"/>
+          </a:xfrm>
+        </p:spPr>
+        <p:txBody>
+          <a:bodyPr/>
+          <a:lstStyle/>
+          <a:p>
+            <a:r>
+              <a:rPr lang="en-US" dirty="0"/>
+              <a:t>-Team ROOTSHELLL</a:t>
+            </a:r>
+          </a:p>
+        </p:txBody>
+      </p:sp>
+      <p:pic>
+        <p:nvPicPr>
+          <p:cNvPr id="23" name="Picture Placeholder 22" descr="A group of people giving each other a high five">
+            <a:extLst>
+              <a:ext uri="{FF2B5EF4-FFF2-40B4-BE49-F238E27FC236}">
+                <a16:creationId xmlns:a16="http://schemas.microsoft.com/office/drawing/2014/main" id="{D92A2E6E-E7AB-92FB-0E6F-133483021C22}"/>
+              </a:ext>
+            </a:extLst>
+          </p:cNvPr>
+          <p:cNvPicPr>
+            <a:picLocks noGrp="1" noChangeAspect="1"/>
+          </p:cNvPicPr>
+          <p:nvPr>
+            <p:ph type="pic" sz="quarter" idx="13"/>
+          </p:nvPr>
+        </p:nvPicPr>
+        <p:blipFill rotWithShape="1">
+          <a:blip r:embed="rId3"/>
+          <a:srcRect l="6095" r="6095"/>
+          <a:stretch/>
+        </p:blipFill>
+        <p:spPr/>
+      </p:pic>
+    </p:spTree>
+    <p:extLst>
+      <p:ext uri="{BB962C8B-B14F-4D97-AF65-F5344CB8AC3E}">
+        <p14:creationId xmlns:p14="http://schemas.microsoft.com/office/powerpoint/2010/main" val="2770959368"/>
+      </p:ext>
+    </p:extLst>
+  </p:cSld>
+  <p:clrMapOvr>
+    <a:masterClrMapping/>
+  </p:clrMapOvr>
+</p:sld>
+</file>
+
 <file path=ppt/slides/slide2.xml><?xml version="1.0" encoding="utf-8"?>
 <p:sld xmlns:a="http://schemas.openxmlformats.org/drawingml/2006/main" xmlns:r="http://schemas.openxmlformats.org/officeDocument/2006/relationships" xmlns:p="http://schemas.openxmlformats.org/presentationml/2006/main">
   <p:cSld>
@@ -20007,14 +20207,14 @@
             <p:ph idx="1"/>
             <p:extLst>
               <p:ext uri="{D42A27DB-BD31-4B8C-83A1-F6EECF244321}">
-                <p14:modId xmlns:p14="http://schemas.microsoft.com/office/powerpoint/2010/main" val="791654581"/>
+                <p14:modId xmlns:p14="http://schemas.microsoft.com/office/powerpoint/2010/main" val="3204798404"/>
               </p:ext>
             </p:extLst>
           </p:nvPr>
         </p:nvGraphicFramePr>
         <p:xfrm>
-          <a:off x="4900613" y="1179513"/>
-          <a:ext cx="6651625" cy="4659312"/>
+          <a:off x="4506013" y="754144"/>
+          <a:ext cx="7046226" cy="5084681"/>
         </p:xfrm>
         <a:graphic>
           <a:graphicData uri="http://schemas.openxmlformats.org/drawingml/2006/diagram">
@@ -21159,7 +21359,7 @@
           <a:p>
             <a:r>
               <a:rPr lang="en-US" dirty="0"/>
-              <a:t>The network architecture</a:t>
+              <a:t>The network architecture- OJAS</a:t>
             </a:r>
             <a:endParaRPr lang="en-AE" dirty="0"/>
           </a:p>
@@ -21801,13 +22001,16 @@
           </a:bodyPr>
           <a:lstStyle/>
           <a:p>
-            <a:endParaRPr lang="en-US" sz="2000" cap="all" dirty="0">
-              <a:solidFill>
-                <a:srgbClr val="FFFFFF">
-                  <a:alpha val="75000"/>
-                </a:srgbClr>
-              </a:solidFill>
-            </a:endParaRPr>
+            <a:r>
+              <a:rPr lang="en-US" sz="2000" cap="all" dirty="0">
+                <a:solidFill>
+                  <a:srgbClr val="FFFFFF">
+                    <a:alpha val="75000"/>
+                  </a:srgbClr>
+                </a:solidFill>
+              </a:rPr>
+              <a:t>SHUBHAM</a:t>
+            </a:r>
           </a:p>
         </p:txBody>
       </p:sp>
@@ -22343,10 +22546,10 @@
       </p:grpSpPr>
       <p:sp>
         <p:nvSpPr>
-          <p:cNvPr id="31" name="Title 30">
+          <p:cNvPr id="2" name="Title 1">
             <a:extLst>
               <a:ext uri="{FF2B5EF4-FFF2-40B4-BE49-F238E27FC236}">
-                <a16:creationId xmlns:a16="http://schemas.microsoft.com/office/drawing/2014/main" id="{B045D6AF-532B-394C-0C6F-38B6628CE9DF}"/>
+                <a16:creationId xmlns:a16="http://schemas.microsoft.com/office/drawing/2014/main" id="{35426D10-1D1C-19C1-AE00-A97AB14B155A}"/>
               </a:ext>
             </a:extLst>
           </p:cNvPr>
@@ -22364,8 +22567,9 @@
           <a:p>
             <a:r>
               <a:rPr lang="en-US" dirty="0"/>
-              <a:t>Thank you</a:t>
-            </a:r>
+              <a:t>Best practice- NIGAM</a:t>
+            </a:r>
+            <a:endParaRPr lang="en-AE" dirty="0"/>
           </a:p>
         </p:txBody>
       </p:sp>
@@ -22374,7 +22578,7 @@
           <p:cNvPr id="3" name="Content Placeholder 2">
             <a:extLst>
               <a:ext uri="{FF2B5EF4-FFF2-40B4-BE49-F238E27FC236}">
-                <a16:creationId xmlns:a16="http://schemas.microsoft.com/office/drawing/2014/main" id="{2F59B25D-9615-9332-C32E-4F458417E11E}"/>
+                <a16:creationId xmlns:a16="http://schemas.microsoft.com/office/drawing/2014/main" id="{12E9838D-42DD-1D98-494D-306D77E3A12B}"/>
               </a:ext>
             </a:extLst>
           </p:cNvPr>
@@ -22382,53 +22586,22 @@
             <a:spLocks noGrp="1"/>
           </p:cNvSpPr>
           <p:nvPr>
-            <p:ph sz="quarter" idx="4"/>
+            <p:ph idx="1"/>
           </p:nvPr>
         </p:nvSpPr>
-        <p:spPr>
-          <a:xfrm>
-            <a:off x="462151" y="2862480"/>
-            <a:ext cx="3672970" cy="3491849"/>
-          </a:xfrm>
-        </p:spPr>
+        <p:spPr/>
         <p:txBody>
           <a:bodyPr/>
           <a:lstStyle/>
           <a:p>
-            <a:r>
-              <a:rPr lang="en-US" dirty="0"/>
-              <a:t>-Team ROOTSHELLL</a:t>
-            </a:r>
+            <a:endParaRPr lang="en-AE"/>
           </a:p>
         </p:txBody>
       </p:sp>
-      <p:pic>
-        <p:nvPicPr>
-          <p:cNvPr id="23" name="Picture Placeholder 22" descr="A group of people giving each other a high five">
-            <a:extLst>
-              <a:ext uri="{FF2B5EF4-FFF2-40B4-BE49-F238E27FC236}">
-                <a16:creationId xmlns:a16="http://schemas.microsoft.com/office/drawing/2014/main" id="{D92A2E6E-E7AB-92FB-0E6F-133483021C22}"/>
-              </a:ext>
-            </a:extLst>
-          </p:cNvPr>
-          <p:cNvPicPr>
-            <a:picLocks noGrp="1" noChangeAspect="1"/>
-          </p:cNvPicPr>
-          <p:nvPr>
-            <p:ph type="pic" sz="quarter" idx="13"/>
-          </p:nvPr>
-        </p:nvPicPr>
-        <p:blipFill rotWithShape="1">
-          <a:blip r:embed="rId3"/>
-          <a:srcRect l="6095" r="6095"/>
-          <a:stretch/>
-        </p:blipFill>
-        <p:spPr/>
-      </p:pic>
     </p:spTree>
     <p:extLst>
       <p:ext uri="{BB962C8B-B14F-4D97-AF65-F5344CB8AC3E}">
-        <p14:creationId xmlns:p14="http://schemas.microsoft.com/office/powerpoint/2010/main" val="2770959368"/>
+        <p14:creationId xmlns:p14="http://schemas.microsoft.com/office/powerpoint/2010/main" val="3048678996"/>
       </p:ext>
     </p:extLst>
   </p:cSld>
@@ -23298,35 +23471,6 @@
 </file>
 
 <file path=customXml/item1.xml><?xml version="1.0" encoding="utf-8"?>
-<?mso-contentType ?>
-<FormTemplates xmlns="http://schemas.microsoft.com/sharepoint/v3/contenttype/forms">
-  <Display>DocumentLibraryForm</Display>
-  <Edit>DocumentLibraryForm</Edit>
-  <New>DocumentLibraryForm</New>
-</FormTemplates>
-</file>
-
-<file path=customXml/item2.xml><?xml version="1.0" encoding="utf-8"?>
-<p:properties xmlns:p="http://schemas.microsoft.com/office/2006/metadata/properties" xmlns:xsi="http://www.w3.org/2001/XMLSchema-instance" xmlns:pc="http://schemas.microsoft.com/office/infopath/2007/PartnerControls">
-  <documentManagement>
-    <_ip_UnifiedCompliancePolicyUIAction xmlns="http://schemas.microsoft.com/sharepoint/v3" xsi:nil="true"/>
-    <Image xmlns="71af3243-3dd4-4a8d-8c0d-dd76da1f02a5">
-      <Url xsi:nil="true"/>
-      <Description xsi:nil="true"/>
-    </Image>
-    <Status xmlns="71af3243-3dd4-4a8d-8c0d-dd76da1f02a5">Not started</Status>
-    <Background xmlns="71af3243-3dd4-4a8d-8c0d-dd76da1f02a5">false</Background>
-    <_ip_UnifiedCompliancePolicyProperties xmlns="http://schemas.microsoft.com/sharepoint/v3" xsi:nil="true"/>
-    <ImageTagsTaxHTField xmlns="71af3243-3dd4-4a8d-8c0d-dd76da1f02a5">
-      <Terms xmlns="http://schemas.microsoft.com/office/infopath/2007/PartnerControls"/>
-    </ImageTagsTaxHTField>
-    <TaxCatchAll xmlns="230e9df3-be65-4c73-a93b-d1236ebd677e" xsi:nil="true"/>
-    <MediaServiceKeyPoints xmlns="71af3243-3dd4-4a8d-8c0d-dd76da1f02a5" xsi:nil="true"/>
-  </documentManagement>
-</p:properties>
-</file>
-
-<file path=customXml/item3.xml><?xml version="1.0" encoding="utf-8"?>
 <ct:contentTypeSchema xmlns:ct="http://schemas.microsoft.com/office/2006/metadata/contentType" xmlns:ma="http://schemas.microsoft.com/office/2006/metadata/properties/metaAttributes" ct:_="" ma:_="" ma:contentTypeName="Document" ma:contentTypeID="0x01010079F111ED35F8CC479449609E8A0923A6" ma:contentTypeVersion="28" ma:contentTypeDescription="Create a new document." ma:contentTypeScope="" ma:versionID="60f5a4f2d2b0abadcf532d48ebf9cb71">
   <xsd:schema xmlns:xsd="http://www.w3.org/2001/XMLSchema" xmlns:xs="http://www.w3.org/2001/XMLSchema" xmlns:p="http://schemas.microsoft.com/office/2006/metadata/properties" xmlns:ns1="http://schemas.microsoft.com/sharepoint/v3" xmlns:ns2="71af3243-3dd4-4a8d-8c0d-dd76da1f02a5" xmlns:ns3="16c05727-aa75-4e4a-9b5f-8a80a1165891" xmlns:ns4="230e9df3-be65-4c73-a93b-d1236ebd677e" targetNamespace="http://schemas.microsoft.com/office/2006/metadata/properties" ma:root="true" ma:fieldsID="7dd78129e6a1811f84807ad11c651531" ns1:_="" ns2:_="" ns3:_="" ns4:_="">
     <xsd:import namespace="http://schemas.microsoft.com/sharepoint/v3"/>
@@ -23638,27 +23782,36 @@
 </ct:contentTypeSchema>
 </file>
 
-<file path=customXml/itemProps1.xml><?xml version="1.0" encoding="utf-8"?>
-<ds:datastoreItem xmlns:ds="http://schemas.openxmlformats.org/officeDocument/2006/customXml" ds:itemID="{19D1F84C-D1FD-4B1B-9CFD-8E0D96AC4DF2}">
-  <ds:schemaRefs>
-    <ds:schemaRef ds:uri="http://schemas.microsoft.com/sharepoint/v3/contenttype/forms"/>
-  </ds:schemaRefs>
-</ds:datastoreItem>
+<file path=customXml/item2.xml><?xml version="1.0" encoding="utf-8"?>
+<p:properties xmlns:p="http://schemas.microsoft.com/office/2006/metadata/properties" xmlns:xsi="http://www.w3.org/2001/XMLSchema-instance" xmlns:pc="http://schemas.microsoft.com/office/infopath/2007/PartnerControls">
+  <documentManagement>
+    <_ip_UnifiedCompliancePolicyUIAction xmlns="http://schemas.microsoft.com/sharepoint/v3" xsi:nil="true"/>
+    <Image xmlns="71af3243-3dd4-4a8d-8c0d-dd76da1f02a5">
+      <Url xsi:nil="true"/>
+      <Description xsi:nil="true"/>
+    </Image>
+    <Status xmlns="71af3243-3dd4-4a8d-8c0d-dd76da1f02a5">Not started</Status>
+    <Background xmlns="71af3243-3dd4-4a8d-8c0d-dd76da1f02a5">false</Background>
+    <_ip_UnifiedCompliancePolicyProperties xmlns="http://schemas.microsoft.com/sharepoint/v3" xsi:nil="true"/>
+    <ImageTagsTaxHTField xmlns="71af3243-3dd4-4a8d-8c0d-dd76da1f02a5">
+      <Terms xmlns="http://schemas.microsoft.com/office/infopath/2007/PartnerControls"/>
+    </ImageTagsTaxHTField>
+    <TaxCatchAll xmlns="230e9df3-be65-4c73-a93b-d1236ebd677e" xsi:nil="true"/>
+    <MediaServiceKeyPoints xmlns="71af3243-3dd4-4a8d-8c0d-dd76da1f02a5" xsi:nil="true"/>
+  </documentManagement>
+</p:properties>
 </file>
 
-<file path=customXml/itemProps2.xml><?xml version="1.0" encoding="utf-8"?>
-<ds:datastoreItem xmlns:ds="http://schemas.openxmlformats.org/officeDocument/2006/customXml" ds:itemID="{5A00B2AC-C335-4100-B8B3-2D9F49A72906}">
-  <ds:schemaRefs>
-    <ds:schemaRef ds:uri="http://schemas.microsoft.com/office/2006/metadata/properties"/>
-    <ds:schemaRef ds:uri="http://schemas.microsoft.com/office/infopath/2007/PartnerControls"/>
-    <ds:schemaRef ds:uri="http://schemas.microsoft.com/sharepoint/v3"/>
-    <ds:schemaRef ds:uri="71af3243-3dd4-4a8d-8c0d-dd76da1f02a5"/>
-    <ds:schemaRef ds:uri="230e9df3-be65-4c73-a93b-d1236ebd677e"/>
-  </ds:schemaRefs>
-</ds:datastoreItem>
+<file path=customXml/item3.xml><?xml version="1.0" encoding="utf-8"?>
+<?mso-contentType ?>
+<FormTemplates xmlns="http://schemas.microsoft.com/sharepoint/v3/contenttype/forms">
+  <Display>DocumentLibraryForm</Display>
+  <Edit>DocumentLibraryForm</Edit>
+  <New>DocumentLibraryForm</New>
+</FormTemplates>
 </file>
 
-<file path=customXml/itemProps3.xml><?xml version="1.0" encoding="utf-8"?>
+<file path=customXml/itemProps1.xml><?xml version="1.0" encoding="utf-8"?>
 <ds:datastoreItem xmlns:ds="http://schemas.openxmlformats.org/officeDocument/2006/customXml" ds:itemID="{0037C456-A6DA-4DEE-A3FB-4EC3058FD086}">
   <ds:schemaRefs>
     <ds:schemaRef ds:uri="http://schemas.microsoft.com/office/2006/metadata/contentType"/>
@@ -23679,6 +23832,26 @@
 </ds:datastoreItem>
 </file>
 
+<file path=customXml/itemProps2.xml><?xml version="1.0" encoding="utf-8"?>
+<ds:datastoreItem xmlns:ds="http://schemas.openxmlformats.org/officeDocument/2006/customXml" ds:itemID="{5A00B2AC-C335-4100-B8B3-2D9F49A72906}">
+  <ds:schemaRefs>
+    <ds:schemaRef ds:uri="http://schemas.microsoft.com/office/2006/metadata/properties"/>
+    <ds:schemaRef ds:uri="http://schemas.microsoft.com/office/infopath/2007/PartnerControls"/>
+    <ds:schemaRef ds:uri="http://schemas.microsoft.com/sharepoint/v3"/>
+    <ds:schemaRef ds:uri="71af3243-3dd4-4a8d-8c0d-dd76da1f02a5"/>
+    <ds:schemaRef ds:uri="230e9df3-be65-4c73-a93b-d1236ebd677e"/>
+  </ds:schemaRefs>
+</ds:datastoreItem>
+</file>
+
+<file path=customXml/itemProps3.xml><?xml version="1.0" encoding="utf-8"?>
+<ds:datastoreItem xmlns:ds="http://schemas.openxmlformats.org/officeDocument/2006/customXml" ds:itemID="{19D1F84C-D1FD-4B1B-9CFD-8E0D96AC4DF2}">
+  <ds:schemaRefs>
+    <ds:schemaRef ds:uri="http://schemas.microsoft.com/sharepoint/v3/contenttype/forms"/>
+  </ds:schemaRefs>
+</ds:datastoreItem>
+</file>
+
 <file path=docMetadata/LabelInfo.xml><?xml version="1.0" encoding="utf-8"?>
 <clbl:labelList xmlns:clbl="http://schemas.microsoft.com/office/2020/mipLabelMetadata"/>
 </file>
</xml_diff>